<commit_message>
Update Cricket - The Baseball of the British Colonies Andrew Odnoralov.pptx
</commit_message>
<xml_diff>
--- a/Cricket - The Baseball of the British Colonies Andrew Odnoralov.pptx
+++ b/Cricket - The Baseball of the British Colonies Andrew Odnoralov.pptx
@@ -270,7 +270,7 @@
           <a:p>
             <a:fld id="{1E83161A-BC60-4754-8385-D6B9C24D1A87}" type="datetimeFigureOut">
               <a:rPr lang="en-US" smtClean="0"/>
-              <a:t>3/15/2024</a:t>
+              <a:t>3/19/2024</a:t>
             </a:fld>
             <a:endParaRPr lang="en-US"/>
           </a:p>
@@ -468,7 +468,7 @@
           <a:p>
             <a:fld id="{1E83161A-BC60-4754-8385-D6B9C24D1A87}" type="datetimeFigureOut">
               <a:rPr lang="en-US" smtClean="0"/>
-              <a:t>3/15/2024</a:t>
+              <a:t>3/19/2024</a:t>
             </a:fld>
             <a:endParaRPr lang="en-US"/>
           </a:p>
@@ -676,7 +676,7 @@
           <a:p>
             <a:fld id="{1E83161A-BC60-4754-8385-D6B9C24D1A87}" type="datetimeFigureOut">
               <a:rPr lang="en-US" smtClean="0"/>
-              <a:t>3/15/2024</a:t>
+              <a:t>3/19/2024</a:t>
             </a:fld>
             <a:endParaRPr lang="en-US"/>
           </a:p>
@@ -874,7 +874,7 @@
           <a:p>
             <a:fld id="{1E83161A-BC60-4754-8385-D6B9C24D1A87}" type="datetimeFigureOut">
               <a:rPr lang="en-US" smtClean="0"/>
-              <a:t>3/15/2024</a:t>
+              <a:t>3/19/2024</a:t>
             </a:fld>
             <a:endParaRPr lang="en-US"/>
           </a:p>
@@ -1149,7 +1149,7 @@
           <a:p>
             <a:fld id="{1E83161A-BC60-4754-8385-D6B9C24D1A87}" type="datetimeFigureOut">
               <a:rPr lang="en-US" smtClean="0"/>
-              <a:t>3/15/2024</a:t>
+              <a:t>3/19/2024</a:t>
             </a:fld>
             <a:endParaRPr lang="en-US"/>
           </a:p>
@@ -1414,7 +1414,7 @@
           <a:p>
             <a:fld id="{1E83161A-BC60-4754-8385-D6B9C24D1A87}" type="datetimeFigureOut">
               <a:rPr lang="en-US" smtClean="0"/>
-              <a:t>3/15/2024</a:t>
+              <a:t>3/19/2024</a:t>
             </a:fld>
             <a:endParaRPr lang="en-US"/>
           </a:p>
@@ -1826,7 +1826,7 @@
           <a:p>
             <a:fld id="{1E83161A-BC60-4754-8385-D6B9C24D1A87}" type="datetimeFigureOut">
               <a:rPr lang="en-US" smtClean="0"/>
-              <a:t>3/15/2024</a:t>
+              <a:t>3/19/2024</a:t>
             </a:fld>
             <a:endParaRPr lang="en-US"/>
           </a:p>
@@ -1967,7 +1967,7 @@
           <a:p>
             <a:fld id="{1E83161A-BC60-4754-8385-D6B9C24D1A87}" type="datetimeFigureOut">
               <a:rPr lang="en-US" smtClean="0"/>
-              <a:t>3/15/2024</a:t>
+              <a:t>3/19/2024</a:t>
             </a:fld>
             <a:endParaRPr lang="en-US"/>
           </a:p>
@@ -2080,7 +2080,7 @@
           <a:p>
             <a:fld id="{1E83161A-BC60-4754-8385-D6B9C24D1A87}" type="datetimeFigureOut">
               <a:rPr lang="en-US" smtClean="0"/>
-              <a:t>3/15/2024</a:t>
+              <a:t>3/19/2024</a:t>
             </a:fld>
             <a:endParaRPr lang="en-US"/>
           </a:p>
@@ -2391,7 +2391,7 @@
           <a:p>
             <a:fld id="{1E83161A-BC60-4754-8385-D6B9C24D1A87}" type="datetimeFigureOut">
               <a:rPr lang="en-US" smtClean="0"/>
-              <a:t>3/15/2024</a:t>
+              <a:t>3/19/2024</a:t>
             </a:fld>
             <a:endParaRPr lang="en-US"/>
           </a:p>
@@ -2679,7 +2679,7 @@
           <a:p>
             <a:fld id="{1E83161A-BC60-4754-8385-D6B9C24D1A87}" type="datetimeFigureOut">
               <a:rPr lang="en-US" smtClean="0"/>
-              <a:t>3/15/2024</a:t>
+              <a:t>3/19/2024</a:t>
             </a:fld>
             <a:endParaRPr lang="en-US"/>
           </a:p>
@@ -2923,7 +2923,7 @@
           <a:p>
             <a:fld id="{1E83161A-BC60-4754-8385-D6B9C24D1A87}" type="datetimeFigureOut">
               <a:rPr lang="en-US" smtClean="0"/>
-              <a:t>3/15/2024</a:t>
+              <a:t>3/19/2024</a:t>
             </a:fld>
             <a:endParaRPr lang="en-US"/>
           </a:p>
@@ -4145,7 +4145,7 @@
             <a:pPr lvl="1"/>
             <a:r>
               <a:rPr lang="en-US" sz="1400" dirty="0"/>
-              <a:t>Salary data to show drastic wealth gap and broken system (10 years of team control and player auction)</a:t>
+              <a:t>Salary data (10 years of team control and player auction)</a:t>
             </a:r>
           </a:p>
           <a:p>

</xml_diff>